<commit_message>
add records for presentation
</commit_message>
<xml_diff>
--- a/Slides_and_Reports/personal project.pptx
+++ b/Slides_and_Reports/personal project.pptx
@@ -1239,8 +1239,8 @@
             </a:lnSpc>
           </a:pPr>
           <a:r>
-            <a:rPr lang="en-US"/>
-            <a:t>Technology used</a:t>
+            <a:rPr lang="en-US" dirty="0"/>
+            <a:t>Techniques used</a:t>
           </a:r>
         </a:p>
       </dgm:t>
@@ -2450,8 +2450,8 @@
             <a:buNone/>
           </a:pPr>
           <a:r>
-            <a:rPr lang="en-US" sz="1900" kern="1200"/>
-            <a:t>Technology used</a:t>
+            <a:rPr lang="en-US" sz="1900" kern="1200" dirty="0"/>
+            <a:t>Techniques used</a:t>
           </a:r>
         </a:p>
       </dsp:txBody>
@@ -4026,7 +4026,7 @@
           <a:p>
             <a:fld id="{DABFF1B3-1DEB-C94C-AEF7-9B8CF470D39F}" type="datetimeFigureOut">
               <a:rPr lang="en-CN" smtClean="0"/>
-              <a:t>2024/5/25</a:t>
+              <a:t>2024/5/26</a:t>
             </a:fld>
             <a:endParaRPr lang="en-CN"/>
           </a:p>
@@ -4632,6 +4632,258 @@
           <a:bodyPr/>
           <a:lstStyle/>
           <a:p>
+            <a:endParaRPr lang="en-CN"/>
+          </a:p>
+        </p:txBody>
+      </p:sp>
+      <p:sp>
+        <p:nvSpPr>
+          <p:cNvPr id="4" name="Slide Number Placeholder 3"/>
+          <p:cNvSpPr>
+            <a:spLocks noGrp="1"/>
+          </p:cNvSpPr>
+          <p:nvPr>
+            <p:ph type="sldNum" sz="quarter" idx="5"/>
+          </p:nvPr>
+        </p:nvSpPr>
+        <p:spPr/>
+        <p:txBody>
+          <a:bodyPr/>
+          <a:lstStyle/>
+          <a:p>
+            <a:fld id="{633309CD-5A6B-6244-AD84-8E152E7F6DFB}" type="slidenum">
+              <a:rPr lang="en-CN" smtClean="0"/>
+              <a:t>7</a:t>
+            </a:fld>
+            <a:endParaRPr lang="en-CN"/>
+          </a:p>
+        </p:txBody>
+      </p:sp>
+    </p:spTree>
+    <p:extLst>
+      <p:ext uri="{BB962C8B-B14F-4D97-AF65-F5344CB8AC3E}">
+        <p14:creationId xmlns:p14="http://schemas.microsoft.com/office/powerpoint/2010/main" val="2325989319"/>
+      </p:ext>
+    </p:extLst>
+  </p:cSld>
+  <p:clrMapOvr>
+    <a:masterClrMapping/>
+  </p:clrMapOvr>
+</p:notes>
+</file>
+
+<file path=ppt/notesSlides/notesSlide5.xml><?xml version="1.0" encoding="utf-8"?>
+<p:notes xmlns:a="http://schemas.openxmlformats.org/drawingml/2006/main" xmlns:r="http://schemas.openxmlformats.org/officeDocument/2006/relationships" xmlns:p="http://schemas.openxmlformats.org/presentationml/2006/main">
+  <p:cSld>
+    <p:spTree>
+      <p:nvGrpSpPr>
+        <p:cNvPr id="1" name=""/>
+        <p:cNvGrpSpPr/>
+        <p:nvPr/>
+      </p:nvGrpSpPr>
+      <p:grpSpPr>
+        <a:xfrm>
+          <a:off x="0" y="0"/>
+          <a:ext cx="0" cy="0"/>
+          <a:chOff x="0" y="0"/>
+          <a:chExt cx="0" cy="0"/>
+        </a:xfrm>
+      </p:grpSpPr>
+      <p:sp>
+        <p:nvSpPr>
+          <p:cNvPr id="2" name="Slide Image Placeholder 1"/>
+          <p:cNvSpPr>
+            <a:spLocks noGrp="1" noRot="1" noChangeAspect="1"/>
+          </p:cNvSpPr>
+          <p:nvPr>
+            <p:ph type="sldImg"/>
+          </p:nvPr>
+        </p:nvSpPr>
+        <p:spPr/>
+      </p:sp>
+      <p:sp>
+        <p:nvSpPr>
+          <p:cNvPr id="3" name="Notes Placeholder 2"/>
+          <p:cNvSpPr>
+            <a:spLocks noGrp="1"/>
+          </p:cNvSpPr>
+          <p:nvPr>
+            <p:ph type="body" idx="1"/>
+          </p:nvPr>
+        </p:nvSpPr>
+        <p:spPr/>
+        <p:txBody>
+          <a:bodyPr/>
+          <a:lstStyle/>
+          <a:p>
+            <a:endParaRPr lang="en-CN"/>
+          </a:p>
+        </p:txBody>
+      </p:sp>
+      <p:sp>
+        <p:nvSpPr>
+          <p:cNvPr id="4" name="Slide Number Placeholder 3"/>
+          <p:cNvSpPr>
+            <a:spLocks noGrp="1"/>
+          </p:cNvSpPr>
+          <p:nvPr>
+            <p:ph type="sldNum" sz="quarter" idx="5"/>
+          </p:nvPr>
+        </p:nvSpPr>
+        <p:spPr/>
+        <p:txBody>
+          <a:bodyPr/>
+          <a:lstStyle/>
+          <a:p>
+            <a:fld id="{633309CD-5A6B-6244-AD84-8E152E7F6DFB}" type="slidenum">
+              <a:rPr lang="en-CN" smtClean="0"/>
+              <a:t>9</a:t>
+            </a:fld>
+            <a:endParaRPr lang="en-CN"/>
+          </a:p>
+        </p:txBody>
+      </p:sp>
+    </p:spTree>
+    <p:extLst>
+      <p:ext uri="{BB962C8B-B14F-4D97-AF65-F5344CB8AC3E}">
+        <p14:creationId xmlns:p14="http://schemas.microsoft.com/office/powerpoint/2010/main" val="1704465612"/>
+      </p:ext>
+    </p:extLst>
+  </p:cSld>
+  <p:clrMapOvr>
+    <a:masterClrMapping/>
+  </p:clrMapOvr>
+</p:notes>
+</file>
+
+<file path=ppt/notesSlides/notesSlide6.xml><?xml version="1.0" encoding="utf-8"?>
+<p:notes xmlns:a="http://schemas.openxmlformats.org/drawingml/2006/main" xmlns:r="http://schemas.openxmlformats.org/officeDocument/2006/relationships" xmlns:p="http://schemas.openxmlformats.org/presentationml/2006/main">
+  <p:cSld>
+    <p:spTree>
+      <p:nvGrpSpPr>
+        <p:cNvPr id="1" name=""/>
+        <p:cNvGrpSpPr/>
+        <p:nvPr/>
+      </p:nvGrpSpPr>
+      <p:grpSpPr>
+        <a:xfrm>
+          <a:off x="0" y="0"/>
+          <a:ext cx="0" cy="0"/>
+          <a:chOff x="0" y="0"/>
+          <a:chExt cx="0" cy="0"/>
+        </a:xfrm>
+      </p:grpSpPr>
+      <p:sp>
+        <p:nvSpPr>
+          <p:cNvPr id="2" name="Slide Image Placeholder 1"/>
+          <p:cNvSpPr>
+            <a:spLocks noGrp="1" noRot="1" noChangeAspect="1"/>
+          </p:cNvSpPr>
+          <p:nvPr>
+            <p:ph type="sldImg"/>
+          </p:nvPr>
+        </p:nvSpPr>
+        <p:spPr/>
+      </p:sp>
+      <p:sp>
+        <p:nvSpPr>
+          <p:cNvPr id="3" name="Notes Placeholder 2"/>
+          <p:cNvSpPr>
+            <a:spLocks noGrp="1"/>
+          </p:cNvSpPr>
+          <p:nvPr>
+            <p:ph type="body" idx="1"/>
+          </p:nvPr>
+        </p:nvSpPr>
+        <p:spPr/>
+        <p:txBody>
+          <a:bodyPr/>
+          <a:lstStyle/>
+          <a:p>
+            <a:endParaRPr lang="en-CN"/>
+          </a:p>
+        </p:txBody>
+      </p:sp>
+      <p:sp>
+        <p:nvSpPr>
+          <p:cNvPr id="4" name="Slide Number Placeholder 3"/>
+          <p:cNvSpPr>
+            <a:spLocks noGrp="1"/>
+          </p:cNvSpPr>
+          <p:nvPr>
+            <p:ph type="sldNum" sz="quarter" idx="5"/>
+          </p:nvPr>
+        </p:nvSpPr>
+        <p:spPr/>
+        <p:txBody>
+          <a:bodyPr/>
+          <a:lstStyle/>
+          <a:p>
+            <a:fld id="{633309CD-5A6B-6244-AD84-8E152E7F6DFB}" type="slidenum">
+              <a:rPr lang="en-CN" smtClean="0"/>
+              <a:t>10</a:t>
+            </a:fld>
+            <a:endParaRPr lang="en-CN"/>
+          </a:p>
+        </p:txBody>
+      </p:sp>
+    </p:spTree>
+    <p:extLst>
+      <p:ext uri="{BB962C8B-B14F-4D97-AF65-F5344CB8AC3E}">
+        <p14:creationId xmlns:p14="http://schemas.microsoft.com/office/powerpoint/2010/main" val="1800334918"/>
+      </p:ext>
+    </p:extLst>
+  </p:cSld>
+  <p:clrMapOvr>
+    <a:masterClrMapping/>
+  </p:clrMapOvr>
+</p:notes>
+</file>
+
+<file path=ppt/notesSlides/notesSlide7.xml><?xml version="1.0" encoding="utf-8"?>
+<p:notes xmlns:a="http://schemas.openxmlformats.org/drawingml/2006/main" xmlns:r="http://schemas.openxmlformats.org/officeDocument/2006/relationships" xmlns:p="http://schemas.openxmlformats.org/presentationml/2006/main">
+  <p:cSld>
+    <p:spTree>
+      <p:nvGrpSpPr>
+        <p:cNvPr id="1" name=""/>
+        <p:cNvGrpSpPr/>
+        <p:nvPr/>
+      </p:nvGrpSpPr>
+      <p:grpSpPr>
+        <a:xfrm>
+          <a:off x="0" y="0"/>
+          <a:ext cx="0" cy="0"/>
+          <a:chOff x="0" y="0"/>
+          <a:chExt cx="0" cy="0"/>
+        </a:xfrm>
+      </p:grpSpPr>
+      <p:sp>
+        <p:nvSpPr>
+          <p:cNvPr id="2" name="Slide Image Placeholder 1"/>
+          <p:cNvSpPr>
+            <a:spLocks noGrp="1" noRot="1" noChangeAspect="1"/>
+          </p:cNvSpPr>
+          <p:nvPr>
+            <p:ph type="sldImg"/>
+          </p:nvPr>
+        </p:nvSpPr>
+        <p:spPr/>
+      </p:sp>
+      <p:sp>
+        <p:nvSpPr>
+          <p:cNvPr id="3" name="Notes Placeholder 2"/>
+          <p:cNvSpPr>
+            <a:spLocks noGrp="1"/>
+          </p:cNvSpPr>
+          <p:nvPr>
+            <p:ph type="body" idx="1"/>
+          </p:nvPr>
+        </p:nvSpPr>
+        <p:spPr/>
+        <p:txBody>
+          <a:bodyPr/>
+          <a:lstStyle/>
+          <a:p>
             <a:r>
               <a:rPr lang="en-US" dirty="0"/>
               <a:t>https://</a:t>
@@ -4715,7 +4967,7 @@
 </p:notes>
 </file>
 
-<file path=ppt/notesSlides/notesSlide5.xml><?xml version="1.0" encoding="utf-8"?>
+<file path=ppt/notesSlides/notesSlide8.xml><?xml version="1.0" encoding="utf-8"?>
 <p:notes xmlns:a="http://schemas.openxmlformats.org/drawingml/2006/main" xmlns:r="http://schemas.openxmlformats.org/officeDocument/2006/relationships" xmlns:p="http://schemas.openxmlformats.org/presentationml/2006/main">
   <p:cSld>
     <p:spTree>
@@ -4976,7 +5228,7 @@
           <a:p>
             <a:fld id="{DBEB92EF-94D7-5C4A-A8AE-2B6158C176E4}" type="datetimeFigureOut">
               <a:rPr lang="en-CN" smtClean="0"/>
-              <a:t>2024/5/25</a:t>
+              <a:t>2024/5/26</a:t>
             </a:fld>
             <a:endParaRPr lang="en-CN"/>
           </a:p>
@@ -5176,7 +5428,7 @@
           <a:p>
             <a:fld id="{DBEB92EF-94D7-5C4A-A8AE-2B6158C176E4}" type="datetimeFigureOut">
               <a:rPr lang="en-CN" smtClean="0"/>
-              <a:t>2024/5/25</a:t>
+              <a:t>2024/5/26</a:t>
             </a:fld>
             <a:endParaRPr lang="en-CN"/>
           </a:p>
@@ -5386,7 +5638,7 @@
           <a:p>
             <a:fld id="{DBEB92EF-94D7-5C4A-A8AE-2B6158C176E4}" type="datetimeFigureOut">
               <a:rPr lang="en-CN" smtClean="0"/>
-              <a:t>2024/5/25</a:t>
+              <a:t>2024/5/26</a:t>
             </a:fld>
             <a:endParaRPr lang="en-CN"/>
           </a:p>
@@ -5586,7 +5838,7 @@
           <a:p>
             <a:fld id="{DBEB92EF-94D7-5C4A-A8AE-2B6158C176E4}" type="datetimeFigureOut">
               <a:rPr lang="en-CN" smtClean="0"/>
-              <a:t>2024/5/25</a:t>
+              <a:t>2024/5/26</a:t>
             </a:fld>
             <a:endParaRPr lang="en-CN"/>
           </a:p>
@@ -5862,7 +6114,7 @@
           <a:p>
             <a:fld id="{DBEB92EF-94D7-5C4A-A8AE-2B6158C176E4}" type="datetimeFigureOut">
               <a:rPr lang="en-CN" smtClean="0"/>
-              <a:t>2024/5/25</a:t>
+              <a:t>2024/5/26</a:t>
             </a:fld>
             <a:endParaRPr lang="en-CN"/>
           </a:p>
@@ -6130,7 +6382,7 @@
           <a:p>
             <a:fld id="{DBEB92EF-94D7-5C4A-A8AE-2B6158C176E4}" type="datetimeFigureOut">
               <a:rPr lang="en-CN" smtClean="0"/>
-              <a:t>2024/5/25</a:t>
+              <a:t>2024/5/26</a:t>
             </a:fld>
             <a:endParaRPr lang="en-CN"/>
           </a:p>
@@ -6545,7 +6797,7 @@
           <a:p>
             <a:fld id="{DBEB92EF-94D7-5C4A-A8AE-2B6158C176E4}" type="datetimeFigureOut">
               <a:rPr lang="en-CN" smtClean="0"/>
-              <a:t>2024/5/25</a:t>
+              <a:t>2024/5/26</a:t>
             </a:fld>
             <a:endParaRPr lang="en-CN"/>
           </a:p>
@@ -6687,7 +6939,7 @@
           <a:p>
             <a:fld id="{DBEB92EF-94D7-5C4A-A8AE-2B6158C176E4}" type="datetimeFigureOut">
               <a:rPr lang="en-CN" smtClean="0"/>
-              <a:t>2024/5/25</a:t>
+              <a:t>2024/5/26</a:t>
             </a:fld>
             <a:endParaRPr lang="en-CN"/>
           </a:p>
@@ -6800,7 +7052,7 @@
           <a:p>
             <a:fld id="{DBEB92EF-94D7-5C4A-A8AE-2B6158C176E4}" type="datetimeFigureOut">
               <a:rPr lang="en-CN" smtClean="0"/>
-              <a:t>2024/5/25</a:t>
+              <a:t>2024/5/26</a:t>
             </a:fld>
             <a:endParaRPr lang="en-CN"/>
           </a:p>
@@ -7113,7 +7365,7 @@
           <a:p>
             <a:fld id="{DBEB92EF-94D7-5C4A-A8AE-2B6158C176E4}" type="datetimeFigureOut">
               <a:rPr lang="en-CN" smtClean="0"/>
-              <a:t>2024/5/25</a:t>
+              <a:t>2024/5/26</a:t>
             </a:fld>
             <a:endParaRPr lang="en-CN"/>
           </a:p>
@@ -7402,7 +7654,7 @@
           <a:p>
             <a:fld id="{DBEB92EF-94D7-5C4A-A8AE-2B6158C176E4}" type="datetimeFigureOut">
               <a:rPr lang="en-CN" smtClean="0"/>
-              <a:t>2024/5/25</a:t>
+              <a:t>2024/5/26</a:t>
             </a:fld>
             <a:endParaRPr lang="en-CN"/>
           </a:p>
@@ -7645,7 +7897,7 @@
           <a:p>
             <a:fld id="{DBEB92EF-94D7-5C4A-A8AE-2B6158C176E4}" type="datetimeFigureOut">
               <a:rPr lang="en-CN" smtClean="0"/>
-              <a:t>2024/5/25</a:t>
+              <a:t>2024/5/26</a:t>
             </a:fld>
             <a:endParaRPr lang="en-CN"/>
           </a:p>
@@ -9019,7 +9271,7 @@
           <a:lstStyle/>
           <a:p>
             <a:r>
-              <a:rPr lang="en-CN" sz="5400">
+              <a:rPr lang="en-CN" sz="5400" dirty="0">
                 <a:solidFill>
                   <a:schemeClr val="bg1"/>
                 </a:solidFill>
@@ -9058,12 +9310,27 @@
           <a:lstStyle/>
           <a:p>
             <a:r>
-              <a:rPr lang="en-CN" sz="2000">
+              <a:rPr lang="en-CN" sz="2000" dirty="0">
                 <a:solidFill>
                   <a:schemeClr val="bg1"/>
                 </a:solidFill>
               </a:rPr>
               <a:t>Chenyun Fu</a:t>
+            </a:r>
+            <a:br>
+              <a:rPr lang="en-CN" sz="2000" dirty="0">
+                <a:solidFill>
+                  <a:schemeClr val="bg1"/>
+                </a:solidFill>
+              </a:rPr>
+            </a:br>
+            <a:r>
+              <a:rPr lang="en-CN" sz="2000" dirty="0">
+                <a:solidFill>
+                  <a:schemeClr val="bg1"/>
+                </a:solidFill>
+              </a:rPr>
+              <a:t>Student Nr. 39224996 </a:t>
             </a:r>
           </a:p>
         </p:txBody>
@@ -10384,69 +10651,6 @@
       </p:grpSpPr>
       <p:sp>
         <p:nvSpPr>
-          <p:cNvPr id="9" name="Rectangle 8">
-            <a:extLst>
-              <a:ext uri="{FF2B5EF4-FFF2-40B4-BE49-F238E27FC236}">
-                <a16:creationId xmlns:a16="http://schemas.microsoft.com/office/drawing/2014/main" id="{A4AC5506-6312-4701-8D3C-40187889A947}"/>
-              </a:ext>
-              <a:ext uri="{C183D7F6-B498-43B3-948B-1728B52AA6E4}">
-                <adec:decorative xmlns:adec="http://schemas.microsoft.com/office/drawing/2017/decorative" val="1"/>
-              </a:ext>
-            </a:extLst>
-          </p:cNvPr>
-          <p:cNvSpPr>
-            <a:spLocks noGrp="1" noRot="1" noChangeAspect="1" noMove="1" noResize="1" noEditPoints="1" noAdjustHandles="1" noChangeArrowheads="1" noChangeShapeType="1" noTextEdit="1"/>
-          </p:cNvSpPr>
-          <p:nvPr>
-            <p:extLst>
-              <p:ext uri="{386F3935-93C4-4BCD-93E2-E3B085C9AB24}">
-                <p16:designElem xmlns:p16="http://schemas.microsoft.com/office/powerpoint/2015/main" val="1"/>
-              </p:ext>
-            </p:extLst>
-          </p:nvPr>
-        </p:nvSpPr>
-        <p:spPr>
-          <a:xfrm>
-            <a:off x="0" y="651752"/>
-            <a:ext cx="12192000" cy="736551"/>
-          </a:xfrm>
-          <a:prstGeom prst="rect">
-            <a:avLst/>
-          </a:prstGeom>
-          <a:solidFill>
-            <a:schemeClr val="tx1"/>
-          </a:solidFill>
-          <a:ln>
-            <a:noFill/>
-          </a:ln>
-        </p:spPr>
-        <p:style>
-          <a:lnRef idx="2">
-            <a:schemeClr val="accent1">
-              <a:shade val="50000"/>
-            </a:schemeClr>
-          </a:lnRef>
-          <a:fillRef idx="1">
-            <a:schemeClr val="accent1"/>
-          </a:fillRef>
-          <a:effectRef idx="0">
-            <a:schemeClr val="accent1"/>
-          </a:effectRef>
-          <a:fontRef idx="minor">
-            <a:schemeClr val="lt1"/>
-          </a:fontRef>
-        </p:style>
-        <p:txBody>
-          <a:bodyPr rtlCol="0" anchor="ctr"/>
-          <a:lstStyle/>
-          <a:p>
-            <a:pPr algn="ctr"/>
-            <a:endParaRPr lang="en-US"/>
-          </a:p>
-        </p:txBody>
-      </p:sp>
-      <p:sp>
-        <p:nvSpPr>
           <p:cNvPr id="2" name="Title 1">
             <a:extLst>
               <a:ext uri="{FF2B5EF4-FFF2-40B4-BE49-F238E27FC236}">
@@ -10463,33 +10667,26 @@
         </p:nvSpPr>
         <p:spPr>
           <a:xfrm>
-            <a:off x="556532" y="643467"/>
-            <a:ext cx="11210925" cy="744836"/>
+            <a:off x="876693" y="741391"/>
+            <a:ext cx="3455821" cy="1616203"/>
           </a:xfrm>
         </p:spPr>
         <p:txBody>
-          <a:bodyPr vert="horz" lIns="91440" tIns="45720" rIns="91440" bIns="45720" rtlCol="0" anchor="ctr">
+          <a:bodyPr vert="horz" lIns="91440" tIns="45720" rIns="91440" bIns="45720" rtlCol="0" anchor="b">
             <a:normAutofit/>
           </a:bodyPr>
           <a:lstStyle/>
           <a:p>
-            <a:pPr algn="ctr"/>
             <a:r>
               <a:rPr lang="en-US" sz="3200" kern="1200">
-                <a:solidFill>
-                  <a:schemeClr val="bg1"/>
-                </a:solidFill>
                 <a:latin typeface="+mj-lt"/>
                 <a:ea typeface="+mj-ea"/>
                 <a:cs typeface="+mj-cs"/>
               </a:rPr>
-              <a:t>Designed Features - </a:t>
+              <a:t>Designed Features – </a:t>
             </a:r>
             <a:r>
               <a:rPr lang="en-US" sz="3200" b="1" kern="1200">
-                <a:solidFill>
-                  <a:schemeClr val="bg1"/>
-                </a:solidFill>
                 <a:latin typeface="+mj-lt"/>
                 <a:ea typeface="+mj-ea"/>
                 <a:cs typeface="+mj-cs"/>
@@ -10497,13 +10694,85 @@
               <a:t>Registration</a:t>
             </a:r>
             <a:endParaRPr lang="en-US" sz="3200" kern="1200">
-              <a:solidFill>
-                <a:schemeClr val="bg1"/>
-              </a:solidFill>
               <a:latin typeface="+mj-lt"/>
               <a:ea typeface="+mj-ea"/>
               <a:cs typeface="+mj-cs"/>
             </a:endParaRPr>
+          </a:p>
+        </p:txBody>
+      </p:sp>
+      <p:sp>
+        <p:nvSpPr>
+          <p:cNvPr id="3" name="Text Placeholder 2">
+            <a:extLst>
+              <a:ext uri="{FF2B5EF4-FFF2-40B4-BE49-F238E27FC236}">
+                <a16:creationId xmlns:a16="http://schemas.microsoft.com/office/drawing/2014/main" id="{6157C4B2-DA68-55D3-D32E-278E52F5F90B}"/>
+              </a:ext>
+            </a:extLst>
+          </p:cNvPr>
+          <p:cNvSpPr>
+            <a:spLocks noGrp="1"/>
+          </p:cNvSpPr>
+          <p:nvPr>
+            <p:ph type="body" idx="4294967295"/>
+          </p:nvPr>
+        </p:nvSpPr>
+        <p:spPr>
+          <a:xfrm>
+            <a:off x="876693" y="2533476"/>
+            <a:ext cx="3455821" cy="3447832"/>
+          </a:xfrm>
+        </p:spPr>
+        <p:txBody>
+          <a:bodyPr anchor="t">
+            <a:normAutofit/>
+          </a:bodyPr>
+          <a:lstStyle/>
+          <a:p>
+            <a:r>
+              <a:rPr lang="en-CN" sz="2000"/>
+              <a:t>client: </a:t>
+            </a:r>
+          </a:p>
+          <a:p>
+            <a:pPr lvl="1"/>
+            <a:r>
+              <a:rPr lang="en-CN" sz="2000"/>
+              <a:t>send request to gateway</a:t>
+            </a:r>
+          </a:p>
+          <a:p>
+            <a:r>
+              <a:rPr lang="en-CN" sz="2000"/>
+              <a:t>gateway: </a:t>
+            </a:r>
+          </a:p>
+          <a:p>
+            <a:pPr lvl="1"/>
+            <a:r>
+              <a:rPr lang="en-CN" sz="2000"/>
+              <a:t>forward request to user managment server</a:t>
+            </a:r>
+          </a:p>
+          <a:p>
+            <a:r>
+              <a:rPr lang="en-CN" sz="2000"/>
+              <a:t>user server: </a:t>
+            </a:r>
+          </a:p>
+          <a:p>
+            <a:pPr lvl="1"/>
+            <a:r>
+              <a:rPr lang="en-CN" sz="2000"/>
+              <a:t>process the request and the data package; </a:t>
+            </a:r>
+          </a:p>
+          <a:p>
+            <a:pPr lvl="1"/>
+            <a:r>
+              <a:rPr lang="en-CN" sz="2000"/>
+              <a:t>send data to database</a:t>
+            </a:r>
           </a:p>
         </p:txBody>
       </p:sp>
@@ -10524,21 +10793,198 @@
           </p:nvPr>
         </p:nvPicPr>
         <p:blipFill>
-          <a:blip r:embed="rId2"/>
+          <a:blip r:embed="rId3"/>
           <a:stretch>
             <a:fillRect/>
           </a:stretch>
         </p:blipFill>
         <p:spPr>
           <a:xfrm>
-            <a:off x="2816746" y="1675227"/>
-            <a:ext cx="6558508" cy="4394199"/>
+            <a:off x="4987672" y="1293225"/>
+            <a:ext cx="6389346" cy="4280859"/>
           </a:xfrm>
           <a:prstGeom prst="rect">
             <a:avLst/>
           </a:prstGeom>
         </p:spPr>
       </p:pic>
+      <p:grpSp>
+        <p:nvGrpSpPr>
+          <p:cNvPr id="14" name="Group 13">
+            <a:extLst>
+              <a:ext uri="{FF2B5EF4-FFF2-40B4-BE49-F238E27FC236}">
+                <a16:creationId xmlns:a16="http://schemas.microsoft.com/office/drawing/2014/main" id="{6258F736-B256-8039-9DC6-F4E49A5C5AD5}"/>
+              </a:ext>
+              <a:ext uri="{C183D7F6-B498-43B3-948B-1728B52AA6E4}">
+                <adec:decorative xmlns:adec="http://schemas.microsoft.com/office/drawing/2017/decorative" val="1"/>
+              </a:ext>
+            </a:extLst>
+          </p:cNvPr>
+          <p:cNvGrpSpPr>
+            <a:grpSpLocks noGrp="1" noUngrp="1" noRot="1" noChangeAspect="1" noMove="1" noResize="1"/>
+          </p:cNvGrpSpPr>
+          <p:nvPr>
+            <p:extLst>
+              <p:ext uri="{386F3935-93C4-4BCD-93E2-E3B085C9AB24}">
+                <p16:designElem xmlns:p16="http://schemas.microsoft.com/office/powerpoint/2015/main" val="1"/>
+              </p:ext>
+            </p:extLst>
+          </p:nvPr>
+        </p:nvGrpSpPr>
+        <p:grpSpPr>
+          <a:xfrm flipH="1">
+            <a:off x="12068638" y="0"/>
+            <a:ext cx="123362" cy="6858000"/>
+            <a:chOff x="12068638" y="0"/>
+            <a:chExt cx="123362" cy="6858000"/>
+          </a:xfrm>
+        </p:grpSpPr>
+        <p:sp>
+          <p:nvSpPr>
+            <p:cNvPr id="15" name="Rectangle 14">
+              <a:extLst>
+                <a:ext uri="{FF2B5EF4-FFF2-40B4-BE49-F238E27FC236}">
+                  <a16:creationId xmlns:a16="http://schemas.microsoft.com/office/drawing/2014/main" id="{10B4520A-996E-330C-99DA-69CA4D89E906}"/>
+                </a:ext>
+                <a:ext uri="{C183D7F6-B498-43B3-948B-1728B52AA6E4}">
+                  <adec:decorative xmlns:adec="http://schemas.microsoft.com/office/drawing/2017/decorative" val="1"/>
+                </a:ext>
+              </a:extLst>
+            </p:cNvPr>
+            <p:cNvSpPr/>
+            <p:nvPr>
+              <p:extLst>
+                <p:ext uri="{386F3935-93C4-4BCD-93E2-E3B085C9AB24}">
+                  <p16:designElem xmlns:p16="http://schemas.microsoft.com/office/powerpoint/2015/main" val="1"/>
+                </p:ext>
+              </p:extLst>
+            </p:nvPr>
+          </p:nvSpPr>
+          <p:spPr>
+            <a:xfrm>
+              <a:off x="12068638" y="0"/>
+              <a:ext cx="123362" cy="6858000"/>
+            </a:xfrm>
+            <a:prstGeom prst="rect">
+              <a:avLst/>
+            </a:prstGeom>
+            <a:gradFill>
+              <a:gsLst>
+                <a:gs pos="0">
+                  <a:schemeClr val="accent2"/>
+                </a:gs>
+                <a:gs pos="100000">
+                  <a:schemeClr val="accent5"/>
+                </a:gs>
+              </a:gsLst>
+              <a:lin ang="1800000" scaled="0"/>
+            </a:gradFill>
+            <a:ln>
+              <a:noFill/>
+            </a:ln>
+          </p:spPr>
+          <p:style>
+            <a:lnRef idx="2">
+              <a:schemeClr val="accent1">
+                <a:shade val="50000"/>
+              </a:schemeClr>
+            </a:lnRef>
+            <a:fillRef idx="1">
+              <a:schemeClr val="accent1"/>
+            </a:fillRef>
+            <a:effectRef idx="0">
+              <a:schemeClr val="accent1"/>
+            </a:effectRef>
+            <a:fontRef idx="minor">
+              <a:schemeClr val="lt1"/>
+            </a:fontRef>
+          </p:style>
+          <p:txBody>
+            <a:bodyPr rtlCol="0" anchor="ctr"/>
+            <a:lstStyle/>
+            <a:p>
+              <a:pPr algn="ctr"/>
+              <a:endParaRPr lang="en-US"/>
+            </a:p>
+          </p:txBody>
+        </p:sp>
+        <p:sp>
+          <p:nvSpPr>
+            <p:cNvPr id="16" name="Rectangle 15">
+              <a:extLst>
+                <a:ext uri="{FF2B5EF4-FFF2-40B4-BE49-F238E27FC236}">
+                  <a16:creationId xmlns:a16="http://schemas.microsoft.com/office/drawing/2014/main" id="{EC8FA945-E356-695F-18D6-CAD4EF34FE4A}"/>
+                </a:ext>
+                <a:ext uri="{C183D7F6-B498-43B3-948B-1728B52AA6E4}">
+                  <adec:decorative xmlns:adec="http://schemas.microsoft.com/office/drawing/2017/decorative" val="1"/>
+                </a:ext>
+              </a:extLst>
+            </p:cNvPr>
+            <p:cNvSpPr/>
+            <p:nvPr>
+              <p:extLst>
+                <p:ext uri="{386F3935-93C4-4BCD-93E2-E3B085C9AB24}">
+                  <p16:designElem xmlns:p16="http://schemas.microsoft.com/office/powerpoint/2015/main" val="1"/>
+                </p:ext>
+              </p:extLst>
+            </p:nvPr>
+          </p:nvSpPr>
+          <p:spPr>
+            <a:xfrm>
+              <a:off x="12068638" y="3527553"/>
+              <a:ext cx="123362" cy="3330447"/>
+            </a:xfrm>
+            <a:prstGeom prst="rect">
+              <a:avLst/>
+            </a:prstGeom>
+            <a:gradFill>
+              <a:gsLst>
+                <a:gs pos="19000">
+                  <a:schemeClr val="accent5">
+                    <a:lumMod val="60000"/>
+                    <a:lumOff val="40000"/>
+                    <a:alpha val="0"/>
+                  </a:schemeClr>
+                </a:gs>
+                <a:gs pos="100000">
+                  <a:schemeClr val="accent5">
+                    <a:lumMod val="60000"/>
+                    <a:lumOff val="40000"/>
+                  </a:schemeClr>
+                </a:gs>
+              </a:gsLst>
+              <a:lin ang="600000" scaled="0"/>
+            </a:gradFill>
+            <a:ln>
+              <a:noFill/>
+            </a:ln>
+          </p:spPr>
+          <p:style>
+            <a:lnRef idx="2">
+              <a:schemeClr val="accent1">
+                <a:shade val="50000"/>
+              </a:schemeClr>
+            </a:lnRef>
+            <a:fillRef idx="1">
+              <a:schemeClr val="accent1"/>
+            </a:fillRef>
+            <a:effectRef idx="0">
+              <a:schemeClr val="accent1"/>
+            </a:effectRef>
+            <a:fontRef idx="minor">
+              <a:schemeClr val="lt1"/>
+            </a:fontRef>
+          </p:style>
+          <p:txBody>
+            <a:bodyPr rtlCol="0" anchor="ctr"/>
+            <a:lstStyle/>
+            <a:p>
+              <a:pPr algn="ctr"/>
+              <a:endParaRPr lang="en-US"/>
+            </a:p>
+          </p:txBody>
+        </p:sp>
+      </p:grpSp>
     </p:spTree>
     <p:extLst>
       <p:ext uri="{BB962C8B-B14F-4D97-AF65-F5344CB8AC3E}">
@@ -10667,7 +11113,7 @@
           <a:p>
             <a:pPr algn="ctr"/>
             <a:r>
-              <a:rPr lang="en-US" kern="1200">
+              <a:rPr lang="en-US" kern="1200" dirty="0">
                 <a:solidFill>
                   <a:schemeClr val="tx1"/>
                 </a:solidFill>
@@ -10678,7 +11124,7 @@
               <a:t>Designed Features - </a:t>
             </a:r>
             <a:r>
-              <a:rPr lang="en-US" b="1" kern="1200">
+              <a:rPr lang="en-US" b="1" kern="1200" dirty="0">
                 <a:solidFill>
                   <a:schemeClr val="tx1"/>
                 </a:solidFill>
@@ -10686,7 +11132,29 @@
                 <a:ea typeface="+mj-ea"/>
                 <a:cs typeface="+mj-cs"/>
               </a:rPr>
-              <a:t>Login and Authentification </a:t>
+              <a:t>Login and </a:t>
+            </a:r>
+            <a:r>
+              <a:rPr lang="en-US" b="1" kern="1200" dirty="0" err="1">
+                <a:solidFill>
+                  <a:schemeClr val="tx1"/>
+                </a:solidFill>
+                <a:latin typeface="+mj-lt"/>
+                <a:ea typeface="+mj-ea"/>
+                <a:cs typeface="+mj-cs"/>
+              </a:rPr>
+              <a:t>Authentification</a:t>
+            </a:r>
+            <a:r>
+              <a:rPr lang="en-US" b="1" kern="1200" dirty="0">
+                <a:solidFill>
+                  <a:schemeClr val="tx1"/>
+                </a:solidFill>
+                <a:latin typeface="+mj-lt"/>
+                <a:ea typeface="+mj-ea"/>
+                <a:cs typeface="+mj-cs"/>
+              </a:rPr>
+              <a:t> </a:t>
             </a:r>
           </a:p>
         </p:txBody>
@@ -10882,7 +11350,7 @@
           <a:p>
             <a:pPr algn="ctr"/>
             <a:r>
-              <a:rPr lang="en-US" sz="3200" kern="1200">
+              <a:rPr lang="en-US" sz="3200" kern="1200" dirty="0">
                 <a:solidFill>
                   <a:schemeClr val="tx1"/>
                 </a:solidFill>
@@ -10890,7 +11358,7 @@
                 <a:ea typeface="+mj-ea"/>
                 <a:cs typeface="+mj-cs"/>
               </a:rPr>
-              <a:t>Technology used - Socket</a:t>
+              <a:t>Techniques used - Socket</a:t>
             </a:r>
           </a:p>
         </p:txBody>
@@ -13262,7 +13730,7 @@
             <p:ph idx="1"/>
             <p:extLst>
               <p:ext uri="{D42A27DB-BD31-4B8C-83A1-F6EECF244321}">
-                <p14:modId xmlns:p14="http://schemas.microsoft.com/office/powerpoint/2010/main" val="2232056330"/>
+                <p14:modId xmlns:p14="http://schemas.microsoft.com/office/powerpoint/2010/main" val="1185953148"/>
               </p:ext>
             </p:extLst>
           </p:nvPr>
@@ -13373,6 +13841,12 @@
             <a:r>
               <a:rPr lang="en-US" dirty="0"/>
               <a:t> interaction</a:t>
+            </a:r>
+          </a:p>
+          <a:p>
+            <a:r>
+              <a:rPr lang="en-US" dirty="0"/>
+              <a:t>Designed for handle user management</a:t>
             </a:r>
           </a:p>
           <a:p>
@@ -14036,7 +14510,7 @@
           <a:p>
             <a:pPr algn="ctr"/>
             <a:r>
-              <a:rPr lang="en-US" sz="3200" kern="1200">
+              <a:rPr lang="en-US" sz="3200" kern="1200" dirty="0">
                 <a:solidFill>
                   <a:schemeClr val="bg1"/>
                 </a:solidFill>
@@ -14208,7 +14682,7 @@
           <a:lstStyle/>
           <a:p>
             <a:r>
-              <a:rPr lang="en-US" sz="4000" kern="1200">
+              <a:rPr lang="en-US" sz="4000" kern="1200" dirty="0">
                 <a:latin typeface="+mj-lt"/>
                 <a:ea typeface="+mj-ea"/>
                 <a:cs typeface="+mj-cs"/>
@@ -14233,7 +14707,7 @@
           <p:nvPr/>
         </p:nvPicPr>
         <p:blipFill rotWithShape="1">
-          <a:blip r:embed="rId2"/>
+          <a:blip r:embed="rId3"/>
           <a:srcRect l="13382" r="20113" b="-1"/>
           <a:stretch/>
         </p:blipFill>
@@ -14833,7 +15307,7 @@
           <a:lstStyle/>
           <a:p>
             <a:r>
-              <a:rPr lang="en-CN" sz="4000"/>
+              <a:rPr lang="en-CN" sz="4000" dirty="0"/>
               <a:t>Designed Features</a:t>
             </a:r>
           </a:p>
@@ -15366,7 +15840,7 @@
           <a:lstStyle/>
           <a:p>
             <a:r>
-              <a:rPr lang="en-CN" sz="4000"/>
+              <a:rPr lang="en-CN" sz="4000" dirty="0"/>
               <a:t>Designed Features</a:t>
             </a:r>
           </a:p>
@@ -15401,19 +15875,24 @@
           <a:lstStyle/>
           <a:p>
             <a:r>
-              <a:rPr lang="en-US" sz="2000" b="1"/>
-              <a:t>Login, Registration and Authentification</a:t>
+              <a:rPr lang="en-US" sz="2000" b="1" dirty="0"/>
+              <a:t>Login, Registration and </a:t>
             </a:r>
-          </a:p>
-          <a:p>
             <a:r>
-              <a:rPr lang="en-US" sz="2000"/>
+              <a:rPr lang="en-US" sz="2000" b="1" dirty="0" err="1"/>
+              <a:t>Authentification</a:t>
+            </a:r>
+            <a:endParaRPr lang="en-US" sz="2000" b="1" dirty="0"/>
+          </a:p>
+          <a:p>
+            <a:r>
+              <a:rPr lang="en-US" sz="2000" dirty="0"/>
               <a:t>Player Profile</a:t>
             </a:r>
           </a:p>
           <a:p>
             <a:r>
-              <a:rPr lang="en-US" sz="2000"/>
+              <a:rPr lang="en-US" sz="2000" dirty="0"/>
               <a:t>Real-time Gaming and Chat Box</a:t>
             </a:r>
           </a:p>
@@ -15434,7 +15913,7 @@
           <p:nvPr/>
         </p:nvPicPr>
         <p:blipFill>
-          <a:blip r:embed="rId2"/>
+          <a:blip r:embed="rId3"/>
           <a:stretch>
             <a:fillRect/>
           </a:stretch>

</xml_diff>